<commit_message>
module 1 (adding notes from Matt/Laura)
</commit_message>
<xml_diff>
--- a/module-1/ppt/1.5-demo.pptx
+++ b/module-1/ppt/1.5-demo.pptx
@@ -245,7 +245,7 @@
           <a:p>
             <a:fld id="{9DAF894A-70DC-1344-8793-A2A3FB288CFE}" type="datetimeFigureOut">
               <a:rPr lang="en-US" smtClean="0"/>
-              <a:t>10/19/20</a:t>
+              <a:t>11/30/20</a:t>
             </a:fld>
             <a:endParaRPr lang="en-US"/>
           </a:p>
@@ -422,7 +422,7 @@
           <a:p>
             <a:fld id="{1FC4BE61-C03A-824C-A357-AB09725BFA9E}" type="datetimeFigureOut">
               <a:rPr lang="en-US" smtClean="0"/>
-              <a:t>10/19/20</a:t>
+              <a:t>11/30/20</a:t>
             </a:fld>
             <a:endParaRPr lang="en-US"/>
           </a:p>
@@ -732,6 +732,120 @@
         <p:txBody>
           <a:bodyPr/>
           <a:lstStyle/>
+          <a:p>
+            <a:pPr marL="0" marR="0" lvl="0" indent="0" algn="l" defTabSz="914400" rtl="0" eaLnBrk="1" fontAlgn="auto" latinLnBrk="0" hangingPunct="1">
+              <a:lnSpc>
+                <a:spcPct val="100000"/>
+              </a:lnSpc>
+              <a:spcBef>
+                <a:spcPts val="0"/>
+              </a:spcBef>
+              <a:spcAft>
+                <a:spcPts val="0"/>
+              </a:spcAft>
+              <a:buClrTx/>
+              <a:buSzTx/>
+              <a:buFontTx/>
+              <a:buNone/>
+              <a:tabLst/>
+              <a:defRPr/>
+            </a:pPr>
+            <a:r>
+              <a:rPr lang="en-US" sz="1200" kern="1200" dirty="0">
+                <a:solidFill>
+                  <a:schemeClr val="tx1"/>
+                </a:solidFill>
+                <a:effectLst/>
+                <a:latin typeface="+mn-lt"/>
+                <a:ea typeface="+mn-ea"/>
+                <a:cs typeface="+mn-cs"/>
+              </a:rPr>
+              <a:t>Matt/Laura:</a:t>
+            </a:r>
+          </a:p>
+          <a:p>
+            <a:pPr marL="0" marR="0" lvl="0" indent="0" algn="l" defTabSz="914400" rtl="0" eaLnBrk="1" fontAlgn="auto" latinLnBrk="0" hangingPunct="1">
+              <a:lnSpc>
+                <a:spcPct val="100000"/>
+              </a:lnSpc>
+              <a:spcBef>
+                <a:spcPts val="0"/>
+              </a:spcBef>
+              <a:spcAft>
+                <a:spcPts val="0"/>
+              </a:spcAft>
+              <a:buClrTx/>
+              <a:buSzTx/>
+              <a:buFontTx/>
+              <a:buNone/>
+              <a:tabLst/>
+              <a:defRPr/>
+            </a:pPr>
+            <a:endParaRPr lang="en-US" sz="1200" kern="1200" dirty="0">
+              <a:solidFill>
+                <a:schemeClr val="tx1"/>
+              </a:solidFill>
+              <a:effectLst/>
+              <a:latin typeface="+mn-lt"/>
+              <a:ea typeface="+mn-ea"/>
+              <a:cs typeface="+mn-cs"/>
+            </a:endParaRPr>
+          </a:p>
+          <a:p>
+            <a:pPr marL="0" marR="0" lvl="0" indent="0" algn="l" defTabSz="914400" rtl="0" eaLnBrk="1" fontAlgn="auto" latinLnBrk="0" hangingPunct="1">
+              <a:lnSpc>
+                <a:spcPct val="100000"/>
+              </a:lnSpc>
+              <a:spcBef>
+                <a:spcPts val="0"/>
+              </a:spcBef>
+              <a:spcAft>
+                <a:spcPts val="0"/>
+              </a:spcAft>
+              <a:buClrTx/>
+              <a:buSzTx/>
+              <a:buFontTx/>
+              <a:buNone/>
+              <a:tabLst/>
+              <a:defRPr/>
+            </a:pPr>
+            <a:r>
+              <a:rPr lang="en-US" sz="1200" kern="1200" dirty="0">
+                <a:solidFill>
+                  <a:schemeClr val="tx1"/>
+                </a:solidFill>
+                <a:effectLst/>
+                <a:latin typeface="+mn-lt"/>
+                <a:ea typeface="+mn-ea"/>
+                <a:cs typeface="+mn-cs"/>
+              </a:rPr>
+              <a:t>The plan is still to set up a </a:t>
+            </a:r>
+            <a:r>
+              <a:rPr lang="en-US" sz="1200" kern="1200" dirty="0" err="1">
+                <a:solidFill>
+                  <a:schemeClr val="tx1"/>
+                </a:solidFill>
+                <a:effectLst/>
+                <a:latin typeface="+mn-lt"/>
+                <a:ea typeface="+mn-ea"/>
+                <a:cs typeface="+mn-cs"/>
+              </a:rPr>
+              <a:t>JupyterHub</a:t>
+            </a:r>
+            <a:r>
+              <a:rPr lang="en-US" sz="1200" kern="1200" dirty="0">
+                <a:solidFill>
+                  <a:schemeClr val="tx1"/>
+                </a:solidFill>
+                <a:effectLst/>
+                <a:latin typeface="+mn-lt"/>
+                <a:ea typeface="+mn-ea"/>
+                <a:cs typeface="+mn-cs"/>
+              </a:rPr>
+              <a:t> instance for learners so that they can do these labs in the cloud without installing anything locally—but you might want to mention the pros and cons of working in the cloud vs installing Python locally, or why they might want to do the latter even if the former is an option.</a:t>
+            </a:r>
+          </a:p>
           <a:p>
             <a:endParaRPr lang="en-US" dirty="0"/>
           </a:p>
@@ -3853,48 +3967,6 @@
               <a:cs typeface="Gotham Bold" pitchFamily="2" charset="0"/>
             </a:endParaRPr>
           </a:p>
-          <a:p>
-            <a:pPr algn="l">
-              <a:lnSpc>
-                <a:spcPct val="125000"/>
-              </a:lnSpc>
-              <a:spcBef>
-                <a:spcPts val="0"/>
-              </a:spcBef>
-            </a:pPr>
-            <a:r>
-              <a:rPr lang="en-US" sz="1800" b="0" i="0" kern="1200" dirty="0">
-                <a:solidFill>
-                  <a:schemeClr val="accent1"/>
-                </a:solidFill>
-                <a:latin typeface="Adobe Garamond Pro" panose="02020502060506020403" pitchFamily="18" charset="77"/>
-                <a:ea typeface="+mn-ea"/>
-                <a:cs typeface="Gotham Bold" pitchFamily="2" charset="0"/>
-              </a:rPr>
-              <a:t>November </a:t>
-            </a:r>
-            <a:r>
-              <a:rPr lang="en-US" sz="1800" dirty="0">
-                <a:solidFill>
-                  <a:schemeClr val="accent1"/>
-                </a:solidFill>
-                <a:latin typeface="Adobe Garamond Pro" panose="02020502060506020403" pitchFamily="18" charset="77"/>
-                <a:cs typeface="Gotham Bold" pitchFamily="2" charset="0"/>
-              </a:rPr>
-              <a:t>10</a:t>
-            </a:r>
-            <a:r>
-              <a:rPr lang="en-US" sz="1800" b="0" i="0" kern="1200" dirty="0">
-                <a:solidFill>
-                  <a:schemeClr val="accent1"/>
-                </a:solidFill>
-                <a:latin typeface="Adobe Garamond Pro" panose="02020502060506020403" pitchFamily="18" charset="77"/>
-                <a:ea typeface="+mn-ea"/>
-                <a:cs typeface="Gotham Bold" pitchFamily="2" charset="0"/>
-              </a:rPr>
-              <a:t>, 2020</a:t>
-            </a:r>
-          </a:p>
         </p:txBody>
       </p:sp>
       <p:sp>
@@ -3950,12 +4022,16 @@
               </a:lnSpc>
             </a:pPr>
             <a:r>
-              <a:rPr lang="en-US" sz="4800" dirty="0">
+              <a:rPr lang="en-US" sz="4800">
                 <a:latin typeface="Arial" panose="020B0604020202020204" pitchFamily="34" charset="0"/>
                 <a:cs typeface="Arial" panose="020B0604020202020204" pitchFamily="34" charset="0"/>
               </a:rPr>
-              <a:t>Module 1: </a:t>
-            </a:r>
+              <a:t>Module 1.5: </a:t>
+            </a:r>
+            <a:endParaRPr lang="en-US" sz="4800" dirty="0">
+              <a:latin typeface="Arial" panose="020B0604020202020204" pitchFamily="34" charset="0"/>
+              <a:cs typeface="Arial" panose="020B0604020202020204" pitchFamily="34" charset="0"/>
+            </a:endParaRPr>
           </a:p>
           <a:p>
             <a:pPr algn="l">

</xml_diff>

<commit_message>
updates module 1 slides (in sync with videos)
</commit_message>
<xml_diff>
--- a/module-1/ppt/1.5-demo.pptx
+++ b/module-1/ppt/1.5-demo.pptx
@@ -7,31 +7,34 @@
     <p:sldMasterId id="2147483651" r:id="rId3"/>
   </p:sldMasterIdLst>
   <p:notesMasterIdLst>
-    <p:notesMasterId r:id="rId8"/>
+    <p:notesMasterId r:id="rId11"/>
   </p:notesMasterIdLst>
   <p:handoutMasterIdLst>
-    <p:handoutMasterId r:id="rId9"/>
+    <p:handoutMasterId r:id="rId12"/>
   </p:handoutMasterIdLst>
   <p:sldIdLst>
     <p:sldId id="285" r:id="rId4"/>
     <p:sldId id="324" r:id="rId5"/>
-    <p:sldId id="326" r:id="rId6"/>
-    <p:sldId id="325" r:id="rId7"/>
+    <p:sldId id="327" r:id="rId6"/>
+    <p:sldId id="328" r:id="rId7"/>
+    <p:sldId id="329" r:id="rId8"/>
+    <p:sldId id="325" r:id="rId9"/>
+    <p:sldId id="330" r:id="rId10"/>
   </p:sldIdLst>
   <p:sldSz cx="12192000" cy="6858000"/>
   <p:notesSz cx="6858000" cy="9144000"/>
   <p:embeddedFontLst>
     <p:embeddedFont>
-      <p:font typeface="Adobe Garamond Pro" panose="02020502060506020403" pitchFamily="18" charset="77"/>
-      <p:regular r:id="rId10"/>
-      <p:italic r:id="rId11"/>
+      <p:font typeface="Adobe Garamond Pro" panose="02020502060506020403" pitchFamily="18" charset="0"/>
+      <p:regular r:id="rId13"/>
+      <p:italic r:id="rId14"/>
     </p:embeddedFont>
     <p:embeddedFont>
       <p:font typeface="Calibri" panose="020F0502020204030204" pitchFamily="34" charset="0"/>
-      <p:regular r:id="rId12"/>
-      <p:bold r:id="rId13"/>
-      <p:italic r:id="rId14"/>
-      <p:boldItalic r:id="rId15"/>
+      <p:regular r:id="rId15"/>
+      <p:bold r:id="rId16"/>
+      <p:italic r:id="rId17"/>
+      <p:boldItalic r:id="rId18"/>
     </p:embeddedFont>
   </p:embeddedFontLst>
   <p:defaultTextStyle>
@@ -151,6 +154,65 @@
 </p:presentation>
 </file>
 
+<file path=ppt/changesInfos/changesInfo1.xml><?xml version="1.0" encoding="utf-8"?>
+<pc:chgInfo xmlns:a="http://schemas.openxmlformats.org/drawingml/2006/main" xmlns:r="http://schemas.openxmlformats.org/officeDocument/2006/relationships" xmlns:ac="http://schemas.microsoft.com/office/drawing/2013/main/command" xmlns:pc="http://schemas.microsoft.com/office/powerpoint/2013/main/command">
+  <pc:docChgLst>
+    <pc:chgData name="Yuxin Chen" userId="41b12e58-6ff4-46be-94f3-dd75746c815c" providerId="ADAL" clId="{85A1E9A9-0A6F-7A44-BE77-F0F89761CEC7}"/>
+    <pc:docChg chg="modSld">
+      <pc:chgData name="Yuxin Chen" userId="41b12e58-6ff4-46be-94f3-dd75746c815c" providerId="ADAL" clId="{85A1E9A9-0A6F-7A44-BE77-F0F89761CEC7}" dt="2021-03-15T07:26:28.496" v="10" actId="20577"/>
+      <pc:docMkLst>
+        <pc:docMk/>
+      </pc:docMkLst>
+      <pc:sldChg chg="modSp mod">
+        <pc:chgData name="Yuxin Chen" userId="41b12e58-6ff4-46be-94f3-dd75746c815c" providerId="ADAL" clId="{85A1E9A9-0A6F-7A44-BE77-F0F89761CEC7}" dt="2021-03-15T07:26:28.496" v="10" actId="20577"/>
+        <pc:sldMkLst>
+          <pc:docMk/>
+          <pc:sldMk cId="2084969503" sldId="285"/>
+        </pc:sldMkLst>
+        <pc:spChg chg="mod">
+          <ac:chgData name="Yuxin Chen" userId="41b12e58-6ff4-46be-94f3-dd75746c815c" providerId="ADAL" clId="{85A1E9A9-0A6F-7A44-BE77-F0F89761CEC7}" dt="2021-03-15T07:26:28.496" v="10" actId="20577"/>
+          <ac:spMkLst>
+            <pc:docMk/>
+            <pc:sldMk cId="2084969503" sldId="285"/>
+            <ac:spMk id="6" creationId="{9CA5815A-CAC7-F347-87AD-F56343C6B87F}"/>
+          </ac:spMkLst>
+        </pc:spChg>
+      </pc:sldChg>
+      <pc:sldChg chg="modSp mod">
+        <pc:chgData name="Yuxin Chen" userId="41b12e58-6ff4-46be-94f3-dd75746c815c" providerId="ADAL" clId="{85A1E9A9-0A6F-7A44-BE77-F0F89761CEC7}" dt="2021-03-15T04:35:37.010" v="4" actId="1076"/>
+        <pc:sldMkLst>
+          <pc:docMk/>
+          <pc:sldMk cId="436671939" sldId="325"/>
+        </pc:sldMkLst>
+        <pc:picChg chg="mod">
+          <ac:chgData name="Yuxin Chen" userId="41b12e58-6ff4-46be-94f3-dd75746c815c" providerId="ADAL" clId="{85A1E9A9-0A6F-7A44-BE77-F0F89761CEC7}" dt="2021-03-15T04:35:37.010" v="4" actId="1076"/>
+          <ac:picMkLst>
+            <pc:docMk/>
+            <pc:sldMk cId="436671939" sldId="325"/>
+            <ac:picMk id="8" creationId="{EED9F5B7-B96A-114A-8999-F7DAD3B3FEEA}"/>
+          </ac:picMkLst>
+        </pc:picChg>
+      </pc:sldChg>
+      <pc:sldChg chg="modSp mod">
+        <pc:chgData name="Yuxin Chen" userId="41b12e58-6ff4-46be-94f3-dd75746c815c" providerId="ADAL" clId="{85A1E9A9-0A6F-7A44-BE77-F0F89761CEC7}" dt="2021-03-15T04:35:43.341" v="5" actId="1076"/>
+        <pc:sldMkLst>
+          <pc:docMk/>
+          <pc:sldMk cId="1246465773" sldId="330"/>
+        </pc:sldMkLst>
+        <pc:picChg chg="mod">
+          <ac:chgData name="Yuxin Chen" userId="41b12e58-6ff4-46be-94f3-dd75746c815c" providerId="ADAL" clId="{85A1E9A9-0A6F-7A44-BE77-F0F89761CEC7}" dt="2021-03-15T04:35:43.341" v="5" actId="1076"/>
+          <ac:picMkLst>
+            <pc:docMk/>
+            <pc:sldMk cId="1246465773" sldId="330"/>
+            <ac:picMk id="8" creationId="{3365C69F-1CAC-8440-8D4B-D122903755A7}"/>
+          </ac:picMkLst>
+        </pc:picChg>
+      </pc:sldChg>
+    </pc:docChg>
+  </pc:docChgLst>
+</pc:chgInfo>
+</file>
+
 <file path=ppt/handoutMasters/handoutMaster1.xml><?xml version="1.0" encoding="utf-8"?>
 <p:handoutMaster xmlns:a="http://schemas.openxmlformats.org/drawingml/2006/main" xmlns:r="http://schemas.openxmlformats.org/officeDocument/2006/relationships" xmlns:p="http://schemas.openxmlformats.org/presentationml/2006/main">
   <p:cSld>
@@ -245,7 +307,7 @@
           <a:p>
             <a:fld id="{9DAF894A-70DC-1344-8793-A2A3FB288CFE}" type="datetimeFigureOut">
               <a:rPr lang="en-US" smtClean="0"/>
-              <a:t>11/30/20</a:t>
+              <a:t>3/15/21</a:t>
             </a:fld>
             <a:endParaRPr lang="en-US"/>
           </a:p>
@@ -422,7 +484,7 @@
           <a:p>
             <a:fld id="{1FC4BE61-C03A-824C-A357-AB09725BFA9E}" type="datetimeFigureOut">
               <a:rPr lang="en-US" smtClean="0"/>
-              <a:t>11/30/20</a:t>
+              <a:t>3/15/21</a:t>
             </a:fld>
             <a:endParaRPr lang="en-US"/>
           </a:p>
@@ -4022,16 +4084,12 @@
               </a:lnSpc>
             </a:pPr>
             <a:r>
-              <a:rPr lang="en-US" sz="4800">
+              <a:rPr lang="en-US" sz="4800" dirty="0">
                 <a:latin typeface="Arial" panose="020B0604020202020204" pitchFamily="34" charset="0"/>
                 <a:cs typeface="Arial" panose="020B0604020202020204" pitchFamily="34" charset="0"/>
               </a:rPr>
               <a:t>Module 1.5: </a:t>
             </a:r>
-            <a:endParaRPr lang="en-US" sz="4800" dirty="0">
-              <a:latin typeface="Arial" panose="020B0604020202020204" pitchFamily="34" charset="0"/>
-              <a:cs typeface="Arial" panose="020B0604020202020204" pitchFamily="34" charset="0"/>
-            </a:endParaRPr>
           </a:p>
           <a:p>
             <a:pPr algn="l">
@@ -4048,31 +4106,20 @@
             </a:r>
           </a:p>
           <a:p>
-            <a:pPr algn="l">
-              <a:lnSpc>
-                <a:spcPct val="100000"/>
-              </a:lnSpc>
-            </a:pPr>
+            <a:pPr algn="l"/>
+            <a:r>
+              <a:rPr lang="en-US" sz="3600" b="0">
+                <a:latin typeface="Arial" panose="020B0604020202020204" pitchFamily="34" charset="0"/>
+                <a:cs typeface="Arial" panose="020B0604020202020204" pitchFamily="34" charset="0"/>
+              </a:rPr>
+              <a:t>Python Env for </a:t>
+            </a:r>
             <a:r>
               <a:rPr lang="en-US" sz="3600" b="0" dirty="0">
                 <a:latin typeface="Arial" panose="020B0604020202020204" pitchFamily="34" charset="0"/>
                 <a:cs typeface="Arial" panose="020B0604020202020204" pitchFamily="34" charset="0"/>
               </a:rPr>
-              <a:t>A simple ML pipeline in </a:t>
-            </a:r>
-            <a:r>
-              <a:rPr lang="en-US" sz="3600" b="0" dirty="0" err="1">
-                <a:latin typeface="Arial" panose="020B0604020202020204" pitchFamily="34" charset="0"/>
-                <a:cs typeface="Arial" panose="020B0604020202020204" pitchFamily="34" charset="0"/>
-              </a:rPr>
-              <a:t>Jupyter</a:t>
-            </a:r>
-            <a:r>
-              <a:rPr lang="en-US" sz="3600" b="0" dirty="0">
-                <a:latin typeface="Arial" panose="020B0604020202020204" pitchFamily="34" charset="0"/>
-                <a:cs typeface="Arial" panose="020B0604020202020204" pitchFamily="34" charset="0"/>
-              </a:rPr>
-              <a:t> Lab</a:t>
+              <a:t>Machine Learning</a:t>
             </a:r>
             <a:endParaRPr lang="en-US" sz="3600" b="0" i="0" dirty="0">
               <a:latin typeface="Arial" panose="020B0604020202020204" pitchFamily="34" charset="0"/>
@@ -4208,7 +4255,15 @@
             </a:r>
             <a:r>
               <a:rPr lang="en-US" dirty="0"/>
-              <a:t> notebook installed</a:t>
+              <a:t> notebook or </a:t>
+            </a:r>
+            <a:r>
+              <a:rPr lang="en-US" dirty="0" err="1"/>
+              <a:t>jupyterlab</a:t>
+            </a:r>
+            <a:r>
+              <a:rPr lang="en-US" dirty="0"/>
+              <a:t> installed</a:t>
             </a:r>
           </a:p>
           <a:p>
@@ -4248,10 +4303,190 @@
       </p:grpSpPr>
       <p:sp>
         <p:nvSpPr>
-          <p:cNvPr id="3" name="Title 2">
+          <p:cNvPr id="5" name="Slide Number Placeholder 4">
             <a:extLst>
               <a:ext uri="{FF2B5EF4-FFF2-40B4-BE49-F238E27FC236}">
-                <a16:creationId xmlns:a16="http://schemas.microsoft.com/office/drawing/2014/main" id="{16AD07B5-C1B2-A54D-8BA1-61D32E7B3B98}"/>
+                <a16:creationId xmlns:a16="http://schemas.microsoft.com/office/drawing/2014/main" id="{C54CF561-2CDF-EF4E-91C2-C9D50E3E8FC4}"/>
+              </a:ext>
+            </a:extLst>
+          </p:cNvPr>
+          <p:cNvSpPr>
+            <a:spLocks noGrp="1"/>
+          </p:cNvSpPr>
+          <p:nvPr>
+            <p:ph type="sldNum" sz="quarter" idx="12"/>
+          </p:nvPr>
+        </p:nvSpPr>
+        <p:spPr/>
+        <p:txBody>
+          <a:bodyPr/>
+          <a:lstStyle/>
+          <a:p>
+            <a:fld id="{256CE055-ECFD-9048-9FD8-7E2D8656A4F7}" type="slidenum">
+              <a:rPr lang="en-US" smtClean="0"/>
+              <a:pPr/>
+              <a:t>3</a:t>
+            </a:fld>
+            <a:endParaRPr lang="en-US" dirty="0"/>
+          </a:p>
+        </p:txBody>
+      </p:sp>
+      <p:pic>
+        <p:nvPicPr>
+          <p:cNvPr id="6" name="Picture 5">
+            <a:extLst>
+              <a:ext uri="{FF2B5EF4-FFF2-40B4-BE49-F238E27FC236}">
+                <a16:creationId xmlns:a16="http://schemas.microsoft.com/office/drawing/2014/main" id="{81C25A8E-B516-3743-8AE2-5B3F4A440F60}"/>
+              </a:ext>
+            </a:extLst>
+          </p:cNvPr>
+          <p:cNvPicPr>
+            <a:picLocks noChangeAspect="1"/>
+          </p:cNvPicPr>
+          <p:nvPr/>
+        </p:nvPicPr>
+        <p:blipFill>
+          <a:blip r:embed="rId2"/>
+          <a:stretch>
+            <a:fillRect/>
+          </a:stretch>
+        </p:blipFill>
+        <p:spPr>
+          <a:xfrm>
+            <a:off x="2524088" y="638323"/>
+            <a:ext cx="6919141" cy="4787752"/>
+          </a:xfrm>
+          <a:prstGeom prst="rect">
+            <a:avLst/>
+          </a:prstGeom>
+        </p:spPr>
+      </p:pic>
+    </p:spTree>
+    <p:extLst>
+      <p:ext uri="{BB962C8B-B14F-4D97-AF65-F5344CB8AC3E}">
+        <p14:creationId xmlns:p14="http://schemas.microsoft.com/office/powerpoint/2010/main" val="1228140095"/>
+      </p:ext>
+    </p:extLst>
+  </p:cSld>
+  <p:clrMapOvr>
+    <a:masterClrMapping/>
+  </p:clrMapOvr>
+</p:sld>
+</file>
+
+<file path=ppt/slides/slide4.xml><?xml version="1.0" encoding="utf-8"?>
+<p:sld xmlns:a="http://schemas.openxmlformats.org/drawingml/2006/main" xmlns:r="http://schemas.openxmlformats.org/officeDocument/2006/relationships" xmlns:p="http://schemas.openxmlformats.org/presentationml/2006/main">
+  <p:cSld>
+    <p:spTree>
+      <p:nvGrpSpPr>
+        <p:cNvPr id="1" name=""/>
+        <p:cNvGrpSpPr/>
+        <p:nvPr/>
+      </p:nvGrpSpPr>
+      <p:grpSpPr>
+        <a:xfrm>
+          <a:off x="0" y="0"/>
+          <a:ext cx="0" cy="0"/>
+          <a:chOff x="0" y="0"/>
+          <a:chExt cx="0" cy="0"/>
+        </a:xfrm>
+      </p:grpSpPr>
+      <p:sp>
+        <p:nvSpPr>
+          <p:cNvPr id="2" name="Slide Number Placeholder 1">
+            <a:extLst>
+              <a:ext uri="{FF2B5EF4-FFF2-40B4-BE49-F238E27FC236}">
+                <a16:creationId xmlns:a16="http://schemas.microsoft.com/office/drawing/2014/main" id="{76800075-F33A-994B-B5A8-D006EBF6C6D9}"/>
+              </a:ext>
+            </a:extLst>
+          </p:cNvPr>
+          <p:cNvSpPr>
+            <a:spLocks noGrp="1"/>
+          </p:cNvSpPr>
+          <p:nvPr>
+            <p:ph type="sldNum" sz="quarter" idx="12"/>
+          </p:nvPr>
+        </p:nvSpPr>
+        <p:spPr/>
+        <p:txBody>
+          <a:bodyPr/>
+          <a:lstStyle/>
+          <a:p>
+            <a:fld id="{256CE055-ECFD-9048-9FD8-7E2D8656A4F7}" type="slidenum">
+              <a:rPr lang="en-US" smtClean="0"/>
+              <a:pPr/>
+              <a:t>4</a:t>
+            </a:fld>
+            <a:endParaRPr lang="en-US" dirty="0"/>
+          </a:p>
+        </p:txBody>
+      </p:sp>
+      <p:pic>
+        <p:nvPicPr>
+          <p:cNvPr id="3" name="Picture 2">
+            <a:extLst>
+              <a:ext uri="{FF2B5EF4-FFF2-40B4-BE49-F238E27FC236}">
+                <a16:creationId xmlns:a16="http://schemas.microsoft.com/office/drawing/2014/main" id="{A400C484-1404-DA43-982F-968548E7F329}"/>
+              </a:ext>
+            </a:extLst>
+          </p:cNvPr>
+          <p:cNvPicPr>
+            <a:picLocks noChangeAspect="1"/>
+          </p:cNvPicPr>
+          <p:nvPr/>
+        </p:nvPicPr>
+        <p:blipFill>
+          <a:blip r:embed="rId2"/>
+          <a:stretch>
+            <a:fillRect/>
+          </a:stretch>
+        </p:blipFill>
+        <p:spPr>
+          <a:xfrm>
+            <a:off x="857794" y="1420191"/>
+            <a:ext cx="10476411" cy="2931380"/>
+          </a:xfrm>
+          <a:prstGeom prst="rect">
+            <a:avLst/>
+          </a:prstGeom>
+        </p:spPr>
+      </p:pic>
+    </p:spTree>
+    <p:extLst>
+      <p:ext uri="{BB962C8B-B14F-4D97-AF65-F5344CB8AC3E}">
+        <p14:creationId xmlns:p14="http://schemas.microsoft.com/office/powerpoint/2010/main" val="2227339225"/>
+      </p:ext>
+    </p:extLst>
+  </p:cSld>
+  <p:clrMapOvr>
+    <a:masterClrMapping/>
+  </p:clrMapOvr>
+</p:sld>
+</file>
+
+<file path=ppt/slides/slide5.xml><?xml version="1.0" encoding="utf-8"?>
+<p:sld xmlns:a="http://schemas.openxmlformats.org/drawingml/2006/main" xmlns:r="http://schemas.openxmlformats.org/officeDocument/2006/relationships" xmlns:p="http://schemas.openxmlformats.org/presentationml/2006/main">
+  <p:cSld>
+    <p:spTree>
+      <p:nvGrpSpPr>
+        <p:cNvPr id="1" name=""/>
+        <p:cNvGrpSpPr/>
+        <p:nvPr/>
+      </p:nvGrpSpPr>
+      <p:grpSpPr>
+        <a:xfrm>
+          <a:off x="0" y="0"/>
+          <a:ext cx="0" cy="0"/>
+          <a:chOff x="0" y="0"/>
+          <a:chExt cx="0" cy="0"/>
+        </a:xfrm>
+      </p:grpSpPr>
+      <p:sp>
+        <p:nvSpPr>
+          <p:cNvPr id="6" name="Title 5">
+            <a:extLst>
+              <a:ext uri="{FF2B5EF4-FFF2-40B4-BE49-F238E27FC236}">
+                <a16:creationId xmlns:a16="http://schemas.microsoft.com/office/drawing/2014/main" id="{BDB466E1-CF2A-FB45-9FF4-3FE954A05AAE}"/>
               </a:ext>
             </a:extLst>
           </p:cNvPr>
@@ -4269,17 +4504,49 @@
           <a:p>
             <a:r>
               <a:rPr lang="en-US" dirty="0"/>
-              <a:t>Installation instructions</a:t>
+              <a:t>Demo of a Simple ML Pipeline: Load Libraries</a:t>
             </a:r>
           </a:p>
         </p:txBody>
       </p:sp>
+      <p:pic>
+        <p:nvPicPr>
+          <p:cNvPr id="8" name="Content Placeholder 7">
+            <a:extLst>
+              <a:ext uri="{FF2B5EF4-FFF2-40B4-BE49-F238E27FC236}">
+                <a16:creationId xmlns:a16="http://schemas.microsoft.com/office/drawing/2014/main" id="{E25008B2-B1C7-F545-A206-727C3483B655}"/>
+              </a:ext>
+            </a:extLst>
+          </p:cNvPr>
+          <p:cNvPicPr>
+            <a:picLocks noGrp="1" noChangeAspect="1"/>
+          </p:cNvPicPr>
+          <p:nvPr>
+            <p:ph idx="1"/>
+          </p:nvPr>
+        </p:nvPicPr>
+        <p:blipFill>
+          <a:blip r:embed="rId2"/>
+          <a:stretch>
+            <a:fillRect/>
+          </a:stretch>
+        </p:blipFill>
+        <p:spPr>
+          <a:xfrm>
+            <a:off x="1308100" y="1615281"/>
+            <a:ext cx="9575800" cy="4013200"/>
+          </a:xfrm>
+          <a:prstGeom prst="rect">
+            <a:avLst/>
+          </a:prstGeom>
+        </p:spPr>
+      </p:pic>
       <p:sp>
         <p:nvSpPr>
-          <p:cNvPr id="4" name="Content Placeholder 3">
+          <p:cNvPr id="5" name="Slide Number Placeholder 4">
             <a:extLst>
               <a:ext uri="{FF2B5EF4-FFF2-40B4-BE49-F238E27FC236}">
-                <a16:creationId xmlns:a16="http://schemas.microsoft.com/office/drawing/2014/main" id="{325521D6-C804-5E47-B5FB-304222FCDE49}"/>
+                <a16:creationId xmlns:a16="http://schemas.microsoft.com/office/drawing/2014/main" id="{1E6C0381-CBAD-3545-88FC-276002E1C5FB}"/>
               </a:ext>
             </a:extLst>
           </p:cNvPr>
@@ -4287,7 +4554,7 @@
             <a:spLocks noGrp="1"/>
           </p:cNvSpPr>
           <p:nvPr>
-            <p:ph idx="1"/>
+            <p:ph type="sldNum" sz="quarter" idx="12"/>
           </p:nvPr>
         </p:nvSpPr>
         <p:spPr/>
@@ -4295,41 +4562,11 @@
           <a:bodyPr/>
           <a:lstStyle/>
           <a:p>
-            <a:r>
-              <a:rPr lang="en-US" dirty="0"/>
-              <a:t>For new Python users, install the </a:t>
-            </a:r>
-            <a:r>
-              <a:rPr lang="en-US" u="sng" dirty="0">
-                <a:hlinkClick r:id="rId2"/>
-              </a:rPr>
-              <a:t>Anaconda</a:t>
-            </a:r>
-            <a:r>
-              <a:rPr lang="en-US" dirty="0"/>
-              <a:t> distribution</a:t>
-            </a:r>
-          </a:p>
-          <a:p>
-            <a:pPr lvl="1"/>
-            <a:r>
-              <a:rPr lang="en-US" dirty="0" err="1"/>
-              <a:t>conda</a:t>
-            </a:r>
-            <a:r>
-              <a:rPr lang="en-US" dirty="0"/>
-              <a:t> install </a:t>
-            </a:r>
-            <a:r>
-              <a:rPr lang="en-US" dirty="0" err="1"/>
-              <a:t>jupyterlab</a:t>
-            </a:r>
-            <a:endParaRPr lang="en-US" dirty="0"/>
-          </a:p>
-          <a:p>
-            <a:endParaRPr lang="en-US" dirty="0"/>
-          </a:p>
-          <a:p>
+            <a:fld id="{256CE055-ECFD-9048-9FD8-7E2D8656A4F7}" type="slidenum">
+              <a:rPr lang="en-US" smtClean="0"/>
+              <a:pPr/>
+              <a:t>5</a:t>
+            </a:fld>
             <a:endParaRPr lang="en-US" dirty="0"/>
           </a:p>
         </p:txBody>
@@ -4337,7 +4574,7 @@
     </p:spTree>
     <p:extLst>
       <p:ext uri="{BB962C8B-B14F-4D97-AF65-F5344CB8AC3E}">
-        <p14:creationId xmlns:p14="http://schemas.microsoft.com/office/powerpoint/2010/main" val="1497207432"/>
+        <p14:creationId xmlns:p14="http://schemas.microsoft.com/office/powerpoint/2010/main" val="4040688768"/>
       </p:ext>
     </p:extLst>
   </p:cSld>
@@ -4347,7 +4584,7 @@
 </p:sld>
 </file>
 
-<file path=ppt/slides/slide4.xml><?xml version="1.0" encoding="utf-8"?>
+<file path=ppt/slides/slide6.xml><?xml version="1.0" encoding="utf-8"?>
 <p:sld xmlns:a="http://schemas.openxmlformats.org/drawingml/2006/main" xmlns:r="http://schemas.openxmlformats.org/officeDocument/2006/relationships" xmlns:p="http://schemas.openxmlformats.org/presentationml/2006/main">
   <p:cSld>
     <p:spTree>
@@ -4387,17 +4624,110 @@
           <a:p>
             <a:r>
               <a:rPr lang="en-US" dirty="0"/>
-              <a:t>Demo of a Simple ML Pipeline</a:t>
+              <a:t>Demo of a Simple ML Pipeline: Loading Data</a:t>
             </a:r>
           </a:p>
         </p:txBody>
       </p:sp>
       <p:pic>
         <p:nvPicPr>
-          <p:cNvPr id="3" name="Content Placeholder 2">
+          <p:cNvPr id="8" name="Picture 7">
             <a:extLst>
               <a:ext uri="{FF2B5EF4-FFF2-40B4-BE49-F238E27FC236}">
-                <a16:creationId xmlns:a16="http://schemas.microsoft.com/office/drawing/2014/main" id="{27A00741-103F-5248-818C-E8D07F14B3BA}"/>
+                <a16:creationId xmlns:a16="http://schemas.microsoft.com/office/drawing/2014/main" id="{EED9F5B7-B96A-114A-8999-F7DAD3B3FEEA}"/>
+              </a:ext>
+            </a:extLst>
+          </p:cNvPr>
+          <p:cNvPicPr>
+            <a:picLocks noChangeAspect="1"/>
+          </p:cNvPicPr>
+          <p:nvPr/>
+        </p:nvPicPr>
+        <p:blipFill>
+          <a:blip r:embed="rId2"/>
+          <a:stretch>
+            <a:fillRect/>
+          </a:stretch>
+        </p:blipFill>
+        <p:spPr>
+          <a:xfrm>
+            <a:off x="946150" y="2368550"/>
+            <a:ext cx="9956800" cy="2120900"/>
+          </a:xfrm>
+          <a:prstGeom prst="rect">
+            <a:avLst/>
+          </a:prstGeom>
+        </p:spPr>
+      </p:pic>
+    </p:spTree>
+    <p:extLst>
+      <p:ext uri="{BB962C8B-B14F-4D97-AF65-F5344CB8AC3E}">
+        <p14:creationId xmlns:p14="http://schemas.microsoft.com/office/powerpoint/2010/main" val="436671939"/>
+      </p:ext>
+    </p:extLst>
+  </p:cSld>
+  <p:clrMapOvr>
+    <a:masterClrMapping/>
+  </p:clrMapOvr>
+</p:sld>
+</file>
+
+<file path=ppt/slides/slide7.xml><?xml version="1.0" encoding="utf-8"?>
+<p:sld xmlns:a="http://schemas.openxmlformats.org/drawingml/2006/main" xmlns:r="http://schemas.openxmlformats.org/officeDocument/2006/relationships" xmlns:p="http://schemas.openxmlformats.org/presentationml/2006/main">
+  <p:cSld>
+    <p:spTree>
+      <p:nvGrpSpPr>
+        <p:cNvPr id="1" name=""/>
+        <p:cNvGrpSpPr/>
+        <p:nvPr/>
+      </p:nvGrpSpPr>
+      <p:grpSpPr>
+        <a:xfrm>
+          <a:off x="0" y="0"/>
+          <a:ext cx="0" cy="0"/>
+          <a:chOff x="0" y="0"/>
+          <a:chExt cx="0" cy="0"/>
+        </a:xfrm>
+      </p:grpSpPr>
+      <p:sp>
+        <p:nvSpPr>
+          <p:cNvPr id="6" name="Title 5">
+            <a:extLst>
+              <a:ext uri="{FF2B5EF4-FFF2-40B4-BE49-F238E27FC236}">
+                <a16:creationId xmlns:a16="http://schemas.microsoft.com/office/drawing/2014/main" id="{C4CEE567-CE13-F343-BA68-61F05E53B818}"/>
+              </a:ext>
+            </a:extLst>
+          </p:cNvPr>
+          <p:cNvSpPr>
+            <a:spLocks noGrp="1"/>
+          </p:cNvSpPr>
+          <p:nvPr>
+            <p:ph type="title"/>
+          </p:nvPr>
+        </p:nvSpPr>
+        <p:spPr/>
+        <p:txBody>
+          <a:bodyPr/>
+          <a:lstStyle/>
+          <a:p>
+            <a:r>
+              <a:rPr lang="en-US" dirty="0"/>
+              <a:t>Demo of a Simple ML Pipeline: Try </a:t>
+            </a:r>
+            <a:r>
+              <a:rPr lang="en-US"/>
+              <a:t>it out!</a:t>
+            </a:r>
+            <a:endParaRPr lang="en-US" dirty="0"/>
+          </a:p>
+        </p:txBody>
+      </p:sp>
+      <p:pic>
+        <p:nvPicPr>
+          <p:cNvPr id="8" name="Content Placeholder 7">
+            <a:extLst>
+              <a:ext uri="{FF2B5EF4-FFF2-40B4-BE49-F238E27FC236}">
+                <a16:creationId xmlns:a16="http://schemas.microsoft.com/office/drawing/2014/main" id="{3365C69F-1CAC-8440-8D4B-D122903755A7}"/>
               </a:ext>
             </a:extLst>
           </p:cNvPr>
@@ -4416,18 +4746,48 @@
         </p:blipFill>
         <p:spPr>
           <a:xfrm>
-            <a:off x="2529703" y="1543050"/>
-            <a:ext cx="7132594" cy="4157663"/>
+            <a:off x="2597149" y="2921000"/>
+            <a:ext cx="6997700" cy="1016000"/>
           </a:xfrm>
           <a:prstGeom prst="rect">
             <a:avLst/>
           </a:prstGeom>
         </p:spPr>
       </p:pic>
+      <p:sp>
+        <p:nvSpPr>
+          <p:cNvPr id="5" name="Slide Number Placeholder 4">
+            <a:extLst>
+              <a:ext uri="{FF2B5EF4-FFF2-40B4-BE49-F238E27FC236}">
+                <a16:creationId xmlns:a16="http://schemas.microsoft.com/office/drawing/2014/main" id="{32B77656-079E-DA43-96AD-6C6D5C1DE203}"/>
+              </a:ext>
+            </a:extLst>
+          </p:cNvPr>
+          <p:cNvSpPr>
+            <a:spLocks noGrp="1"/>
+          </p:cNvSpPr>
+          <p:nvPr>
+            <p:ph type="sldNum" sz="quarter" idx="12"/>
+          </p:nvPr>
+        </p:nvSpPr>
+        <p:spPr/>
+        <p:txBody>
+          <a:bodyPr/>
+          <a:lstStyle/>
+          <a:p>
+            <a:fld id="{256CE055-ECFD-9048-9FD8-7E2D8656A4F7}" type="slidenum">
+              <a:rPr lang="en-US" smtClean="0"/>
+              <a:pPr/>
+              <a:t>7</a:t>
+            </a:fld>
+            <a:endParaRPr lang="en-US" dirty="0"/>
+          </a:p>
+        </p:txBody>
+      </p:sp>
     </p:spTree>
     <p:extLst>
       <p:ext uri="{BB962C8B-B14F-4D97-AF65-F5344CB8AC3E}">
-        <p14:creationId xmlns:p14="http://schemas.microsoft.com/office/powerpoint/2010/main" val="436671939"/>
+        <p14:creationId xmlns:p14="http://schemas.microsoft.com/office/powerpoint/2010/main" val="1246465773"/>
       </p:ext>
     </p:extLst>
   </p:cSld>

</xml_diff>